<commit_message>
missing a little to finish
Haha
</commit_message>
<xml_diff>
--- a/设备.pptx
+++ b/设备.pptx
@@ -256,7 +256,7 @@
           <a:p>
             <a:fld id="{2FB980F9-D67C-45AE-A1F9-5B34263096C7}" type="datetimeFigureOut">
               <a:rPr lang="zh-CN" altLang="en-US" smtClean="0"/>
-              <a:t>2017/5/24</a:t>
+              <a:t>2017/5/25</a:t>
             </a:fld>
             <a:endParaRPr lang="zh-CN" altLang="en-US"/>
           </a:p>
@@ -426,7 +426,7 @@
           <a:p>
             <a:fld id="{2FB980F9-D67C-45AE-A1F9-5B34263096C7}" type="datetimeFigureOut">
               <a:rPr lang="zh-CN" altLang="en-US" smtClean="0"/>
-              <a:t>2017/5/24</a:t>
+              <a:t>2017/5/25</a:t>
             </a:fld>
             <a:endParaRPr lang="zh-CN" altLang="en-US"/>
           </a:p>
@@ -606,7 +606,7 @@
           <a:p>
             <a:fld id="{2FB980F9-D67C-45AE-A1F9-5B34263096C7}" type="datetimeFigureOut">
               <a:rPr lang="zh-CN" altLang="en-US" smtClean="0"/>
-              <a:t>2017/5/24</a:t>
+              <a:t>2017/5/25</a:t>
             </a:fld>
             <a:endParaRPr lang="zh-CN" altLang="en-US"/>
           </a:p>
@@ -776,7 +776,7 @@
           <a:p>
             <a:fld id="{2FB980F9-D67C-45AE-A1F9-5B34263096C7}" type="datetimeFigureOut">
               <a:rPr lang="zh-CN" altLang="en-US" smtClean="0"/>
-              <a:t>2017/5/24</a:t>
+              <a:t>2017/5/25</a:t>
             </a:fld>
             <a:endParaRPr lang="zh-CN" altLang="en-US"/>
           </a:p>
@@ -1022,7 +1022,7 @@
           <a:p>
             <a:fld id="{2FB980F9-D67C-45AE-A1F9-5B34263096C7}" type="datetimeFigureOut">
               <a:rPr lang="zh-CN" altLang="en-US" smtClean="0"/>
-              <a:t>2017/5/24</a:t>
+              <a:t>2017/5/25</a:t>
             </a:fld>
             <a:endParaRPr lang="zh-CN" altLang="en-US"/>
           </a:p>
@@ -1254,7 +1254,7 @@
           <a:p>
             <a:fld id="{2FB980F9-D67C-45AE-A1F9-5B34263096C7}" type="datetimeFigureOut">
               <a:rPr lang="zh-CN" altLang="en-US" smtClean="0"/>
-              <a:t>2017/5/24</a:t>
+              <a:t>2017/5/25</a:t>
             </a:fld>
             <a:endParaRPr lang="zh-CN" altLang="en-US"/>
           </a:p>
@@ -1621,7 +1621,7 @@
           <a:p>
             <a:fld id="{2FB980F9-D67C-45AE-A1F9-5B34263096C7}" type="datetimeFigureOut">
               <a:rPr lang="zh-CN" altLang="en-US" smtClean="0"/>
-              <a:t>2017/5/24</a:t>
+              <a:t>2017/5/25</a:t>
             </a:fld>
             <a:endParaRPr lang="zh-CN" altLang="en-US"/>
           </a:p>
@@ -1739,7 +1739,7 @@
           <a:p>
             <a:fld id="{2FB980F9-D67C-45AE-A1F9-5B34263096C7}" type="datetimeFigureOut">
               <a:rPr lang="zh-CN" altLang="en-US" smtClean="0"/>
-              <a:t>2017/5/24</a:t>
+              <a:t>2017/5/25</a:t>
             </a:fld>
             <a:endParaRPr lang="zh-CN" altLang="en-US"/>
           </a:p>
@@ -1834,7 +1834,7 @@
           <a:p>
             <a:fld id="{2FB980F9-D67C-45AE-A1F9-5B34263096C7}" type="datetimeFigureOut">
               <a:rPr lang="zh-CN" altLang="en-US" smtClean="0"/>
-              <a:t>2017/5/24</a:t>
+              <a:t>2017/5/25</a:t>
             </a:fld>
             <a:endParaRPr lang="zh-CN" altLang="en-US"/>
           </a:p>
@@ -2111,7 +2111,7 @@
           <a:p>
             <a:fld id="{2FB980F9-D67C-45AE-A1F9-5B34263096C7}" type="datetimeFigureOut">
               <a:rPr lang="zh-CN" altLang="en-US" smtClean="0"/>
-              <a:t>2017/5/24</a:t>
+              <a:t>2017/5/25</a:t>
             </a:fld>
             <a:endParaRPr lang="zh-CN" altLang="en-US"/>
           </a:p>
@@ -2364,7 +2364,7 @@
           <a:p>
             <a:fld id="{2FB980F9-D67C-45AE-A1F9-5B34263096C7}" type="datetimeFigureOut">
               <a:rPr lang="zh-CN" altLang="en-US" smtClean="0"/>
-              <a:t>2017/5/24</a:t>
+              <a:t>2017/5/25</a:t>
             </a:fld>
             <a:endParaRPr lang="zh-CN" altLang="en-US"/>
           </a:p>
@@ -2577,7 +2577,7 @@
           <a:p>
             <a:fld id="{2FB980F9-D67C-45AE-A1F9-5B34263096C7}" type="datetimeFigureOut">
               <a:rPr lang="zh-CN" altLang="en-US" smtClean="0"/>
-              <a:t>2017/5/24</a:t>
+              <a:t>2017/5/25</a:t>
             </a:fld>
             <a:endParaRPr lang="zh-CN" altLang="en-US"/>
           </a:p>
@@ -5311,8 +5311,8 @@
         </p:blipFill>
         <p:spPr>
           <a:xfrm>
-            <a:off x="4624578" y="785943"/>
-            <a:ext cx="7219950" cy="5657850"/>
+            <a:off x="5583045" y="1532665"/>
+            <a:ext cx="5521957" cy="4327233"/>
           </a:xfrm>
           <a:prstGeom prst="rect">
             <a:avLst/>
@@ -5343,7 +5343,15 @@
           <a:p>
             <a:r>
               <a:rPr lang="zh-CN" altLang="en-US" sz="3200" dirty="0" smtClean="0"/>
-              <a:t>姿态感应器</a:t>
+              <a:t>姿态</a:t>
+            </a:r>
+            <a:r>
+              <a:rPr lang="zh-CN" altLang="en-US" sz="3200" dirty="0"/>
+              <a:t>传感</a:t>
+            </a:r>
+            <a:r>
+              <a:rPr lang="zh-CN" altLang="en-US" sz="3200" dirty="0" smtClean="0"/>
+              <a:t>器</a:t>
             </a:r>
             <a:endParaRPr lang="zh-CN" altLang="en-US" sz="3200" dirty="0"/>
           </a:p>
@@ -5371,8 +5379,8 @@
         </p:blipFill>
         <p:spPr>
           <a:xfrm>
-            <a:off x="0" y="1792224"/>
-            <a:ext cx="5363523" cy="2651402"/>
+            <a:off x="958468" y="1831888"/>
+            <a:ext cx="4102126" cy="2027843"/>
           </a:xfrm>
           <a:prstGeom prst="rect">
             <a:avLst/>

</xml_diff>